<commit_message>
(DEV) Tema 20, cambios en temario
</commit_message>
<xml_diff>
--- a/assets/curso/20_Tema.pptx
+++ b/assets/curso/20_Tema.pptx
@@ -4,6 +4,9 @@
   <p:sldMasterIdLst>
     <p:sldMasterId id="2147483868" r:id="rId1"/>
   </p:sldMasterIdLst>
+  <p:notesMasterIdLst>
+    <p:notesMasterId r:id="rId30"/>
+  </p:notesMasterIdLst>
   <p:sldIdLst>
     <p:sldId id="256" r:id="rId2"/>
     <p:sldId id="257" r:id="rId3"/>
@@ -286,7 +289,555 @@
       </pc:sldChg>
     </pc:docChg>
   </pc:docChgLst>
+  <pc:docChgLst>
+    <pc:chgData userId="d1a1f1d5db62a25f" providerId="LiveId" clId="{5292E424-8A03-4865-90DE-062A21C5C81F}"/>
+    <pc:docChg chg="custSel modSld">
+      <pc:chgData name="" userId="d1a1f1d5db62a25f" providerId="LiveId" clId="{5292E424-8A03-4865-90DE-062A21C5C81F}" dt="2018-04-09T17:14:52.883" v="159" actId="113"/>
+      <pc:docMkLst>
+        <pc:docMk/>
+      </pc:docMkLst>
+      <pc:sldChg chg="modSp">
+        <pc:chgData name="" userId="d1a1f1d5db62a25f" providerId="LiveId" clId="{5292E424-8A03-4865-90DE-062A21C5C81F}" dt="2018-04-09T16:59:21.681" v="1" actId="20577"/>
+        <pc:sldMkLst>
+          <pc:docMk/>
+          <pc:sldMk cId="4274485727" sldId="270"/>
+        </pc:sldMkLst>
+        <pc:spChg chg="mod">
+          <ac:chgData name="" userId="d1a1f1d5db62a25f" providerId="LiveId" clId="{5292E424-8A03-4865-90DE-062A21C5C81F}" dt="2018-04-09T16:59:21.681" v="1" actId="20577"/>
+          <ac:spMkLst>
+            <pc:docMk/>
+            <pc:sldMk cId="4274485727" sldId="270"/>
+            <ac:spMk id="3" creationId="{E3D45092-5CAC-4BEF-841F-DFD0E19C5F52}"/>
+          </ac:spMkLst>
+        </pc:spChg>
+      </pc:sldChg>
+      <pc:sldChg chg="modSp">
+        <pc:chgData name="" userId="d1a1f1d5db62a25f" providerId="LiveId" clId="{5292E424-8A03-4865-90DE-062A21C5C81F}" dt="2018-04-09T17:01:13.463" v="9" actId="20577"/>
+        <pc:sldMkLst>
+          <pc:docMk/>
+          <pc:sldMk cId="631095727" sldId="271"/>
+        </pc:sldMkLst>
+        <pc:spChg chg="mod">
+          <ac:chgData name="" userId="d1a1f1d5db62a25f" providerId="LiveId" clId="{5292E424-8A03-4865-90DE-062A21C5C81F}" dt="2018-04-09T17:01:13.463" v="9" actId="20577"/>
+          <ac:spMkLst>
+            <pc:docMk/>
+            <pc:sldMk cId="631095727" sldId="271"/>
+            <ac:spMk id="3" creationId="{3820D2BB-58F6-4EC7-86E5-E779E6DDCFB2}"/>
+          </ac:spMkLst>
+        </pc:spChg>
+      </pc:sldChg>
+      <pc:sldChg chg="modSp">
+        <pc:chgData name="" userId="d1a1f1d5db62a25f" providerId="LiveId" clId="{5292E424-8A03-4865-90DE-062A21C5C81F}" dt="2018-04-09T17:03:17.829" v="83" actId="20577"/>
+        <pc:sldMkLst>
+          <pc:docMk/>
+          <pc:sldMk cId="2887323584" sldId="272"/>
+        </pc:sldMkLst>
+        <pc:spChg chg="mod">
+          <ac:chgData name="" userId="d1a1f1d5db62a25f" providerId="LiveId" clId="{5292E424-8A03-4865-90DE-062A21C5C81F}" dt="2018-04-09T17:03:17.829" v="83" actId="20577"/>
+          <ac:spMkLst>
+            <pc:docMk/>
+            <pc:sldMk cId="2887323584" sldId="272"/>
+            <ac:spMk id="3" creationId="{3A43E8D7-1F86-4BA0-ACF4-A4ADA9AEE47C}"/>
+          </ac:spMkLst>
+        </pc:spChg>
+      </pc:sldChg>
+      <pc:sldChg chg="modSp">
+        <pc:chgData name="" userId="d1a1f1d5db62a25f" providerId="LiveId" clId="{5292E424-8A03-4865-90DE-062A21C5C81F}" dt="2018-04-09T17:04:07.340" v="154" actId="20577"/>
+        <pc:sldMkLst>
+          <pc:docMk/>
+          <pc:sldMk cId="3737035864" sldId="273"/>
+        </pc:sldMkLst>
+        <pc:spChg chg="mod">
+          <ac:chgData name="" userId="d1a1f1d5db62a25f" providerId="LiveId" clId="{5292E424-8A03-4865-90DE-062A21C5C81F}" dt="2018-04-09T17:04:07.340" v="154" actId="20577"/>
+          <ac:spMkLst>
+            <pc:docMk/>
+            <pc:sldMk cId="3737035864" sldId="273"/>
+            <ac:spMk id="3" creationId="{651724EB-A5D0-4240-83BE-97EBC4301CAD}"/>
+          </ac:spMkLst>
+        </pc:spChg>
+      </pc:sldChg>
+      <pc:sldChg chg="addSp modSp mod setBg">
+        <pc:chgData name="" userId="d1a1f1d5db62a25f" providerId="LiveId" clId="{5292E424-8A03-4865-90DE-062A21C5C81F}" dt="2018-04-09T17:08:48.675" v="156" actId="26606"/>
+        <pc:sldMkLst>
+          <pc:docMk/>
+          <pc:sldMk cId="567746877" sldId="276"/>
+        </pc:sldMkLst>
+        <pc:spChg chg="mod">
+          <ac:chgData name="" userId="d1a1f1d5db62a25f" providerId="LiveId" clId="{5292E424-8A03-4865-90DE-062A21C5C81F}" dt="2018-04-09T17:08:48.675" v="156" actId="26606"/>
+          <ac:spMkLst>
+            <pc:docMk/>
+            <pc:sldMk cId="567746877" sldId="276"/>
+            <ac:spMk id="2" creationId="{A3DADD64-0D0D-4D5B-A39D-9336DB622D1A}"/>
+          </ac:spMkLst>
+        </pc:spChg>
+        <pc:spChg chg="mod">
+          <ac:chgData name="" userId="d1a1f1d5db62a25f" providerId="LiveId" clId="{5292E424-8A03-4865-90DE-062A21C5C81F}" dt="2018-04-09T17:08:48.675" v="156" actId="26606"/>
+          <ac:spMkLst>
+            <pc:docMk/>
+            <pc:sldMk cId="567746877" sldId="276"/>
+            <ac:spMk id="3" creationId="{A67FA015-4B7C-4954-9F07-2662A70C107C}"/>
+          </ac:spMkLst>
+        </pc:spChg>
+        <pc:picChg chg="add mod ord">
+          <ac:chgData name="" userId="d1a1f1d5db62a25f" providerId="LiveId" clId="{5292E424-8A03-4865-90DE-062A21C5C81F}" dt="2018-04-09T17:08:48.675" v="156" actId="26606"/>
+          <ac:picMkLst>
+            <pc:docMk/>
+            <pc:sldMk cId="567746877" sldId="276"/>
+            <ac:picMk id="4" creationId="{F6DDC8EE-65C2-4553-9389-61E3DE021C2C}"/>
+          </ac:picMkLst>
+        </pc:picChg>
+      </pc:sldChg>
+      <pc:sldChg chg="modSp">
+        <pc:chgData name="" userId="d1a1f1d5db62a25f" providerId="LiveId" clId="{5292E424-8A03-4865-90DE-062A21C5C81F}" dt="2018-04-09T17:14:52.883" v="159" actId="113"/>
+        <pc:sldMkLst>
+          <pc:docMk/>
+          <pc:sldMk cId="1910165418" sldId="278"/>
+        </pc:sldMkLst>
+        <pc:spChg chg="mod">
+          <ac:chgData name="" userId="d1a1f1d5db62a25f" providerId="LiveId" clId="{5292E424-8A03-4865-90DE-062A21C5C81F}" dt="2018-04-09T17:14:52.883" v="159" actId="113"/>
+          <ac:spMkLst>
+            <pc:docMk/>
+            <pc:sldMk cId="1910165418" sldId="278"/>
+            <ac:spMk id="3" creationId="{F17E3EFB-1443-474A-BCAB-DA461E894F98}"/>
+          </ac:spMkLst>
+        </pc:spChg>
+      </pc:sldChg>
+    </pc:docChg>
+  </pc:docChgLst>
 </pc:chgInfo>
+</file>
+
+<file path=ppt/notesMasters/notesMaster1.xml><?xml version="1.0" encoding="utf-8"?>
+<p:notesMaster xmlns:a="http://schemas.openxmlformats.org/drawingml/2006/main" xmlns:r="http://schemas.openxmlformats.org/officeDocument/2006/relationships" xmlns:p="http://schemas.openxmlformats.org/presentationml/2006/main">
+  <p:cSld>
+    <p:bg>
+      <p:bgRef idx="1001">
+        <a:schemeClr val="bg1"/>
+      </p:bgRef>
+    </p:bg>
+    <p:spTree>
+      <p:nvGrpSpPr>
+        <p:cNvPr id="1" name=""/>
+        <p:cNvGrpSpPr/>
+        <p:nvPr/>
+      </p:nvGrpSpPr>
+      <p:grpSpPr>
+        <a:xfrm>
+          <a:off x="0" y="0"/>
+          <a:ext cx="0" cy="0"/>
+          <a:chOff x="0" y="0"/>
+          <a:chExt cx="0" cy="0"/>
+        </a:xfrm>
+      </p:grpSpPr>
+      <p:sp>
+        <p:nvSpPr>
+          <p:cNvPr id="2" name="Marcador de encabezado 1"/>
+          <p:cNvSpPr>
+            <a:spLocks noGrp="1"/>
+          </p:cNvSpPr>
+          <p:nvPr>
+            <p:ph type="hdr" sz="quarter"/>
+          </p:nvPr>
+        </p:nvSpPr>
+        <p:spPr>
+          <a:xfrm>
+            <a:off x="0" y="0"/>
+            <a:ext cx="2971800" cy="458788"/>
+          </a:xfrm>
+          <a:prstGeom prst="rect">
+            <a:avLst/>
+          </a:prstGeom>
+        </p:spPr>
+        <p:txBody>
+          <a:bodyPr vert="horz" lIns="91440" tIns="45720" rIns="91440" bIns="45720" rtlCol="0"/>
+          <a:lstStyle>
+            <a:lvl1pPr algn="l">
+              <a:defRPr sz="1200"/>
+            </a:lvl1pPr>
+          </a:lstStyle>
+          <a:p>
+            <a:endParaRPr lang="es-ES"/>
+          </a:p>
+        </p:txBody>
+      </p:sp>
+      <p:sp>
+        <p:nvSpPr>
+          <p:cNvPr id="3" name="Marcador de fecha 2"/>
+          <p:cNvSpPr>
+            <a:spLocks noGrp="1"/>
+          </p:cNvSpPr>
+          <p:nvPr>
+            <p:ph type="dt" idx="1"/>
+          </p:nvPr>
+        </p:nvSpPr>
+        <p:spPr>
+          <a:xfrm>
+            <a:off x="3884613" y="0"/>
+            <a:ext cx="2971800" cy="458788"/>
+          </a:xfrm>
+          <a:prstGeom prst="rect">
+            <a:avLst/>
+          </a:prstGeom>
+        </p:spPr>
+        <p:txBody>
+          <a:bodyPr vert="horz" lIns="91440" tIns="45720" rIns="91440" bIns="45720" rtlCol="0"/>
+          <a:lstStyle>
+            <a:lvl1pPr algn="r">
+              <a:defRPr sz="1200"/>
+            </a:lvl1pPr>
+          </a:lstStyle>
+          <a:p>
+            <a:fld id="{788B43F6-80FF-4FF8-A8A7-20B45FD169F5}" type="datetimeFigureOut">
+              <a:rPr lang="es-ES" smtClean="0"/>
+              <a:t>09/04/2018</a:t>
+            </a:fld>
+            <a:endParaRPr lang="es-ES"/>
+          </a:p>
+        </p:txBody>
+      </p:sp>
+      <p:sp>
+        <p:nvSpPr>
+          <p:cNvPr id="4" name="Marcador de imagen de diapositiva 3"/>
+          <p:cNvSpPr>
+            <a:spLocks noGrp="1" noRot="1" noChangeAspect="1"/>
+          </p:cNvSpPr>
+          <p:nvPr>
+            <p:ph type="sldImg" idx="2"/>
+          </p:nvPr>
+        </p:nvSpPr>
+        <p:spPr>
+          <a:xfrm>
+            <a:off x="685800" y="1143000"/>
+            <a:ext cx="5486400" cy="3086100"/>
+          </a:xfrm>
+          <a:prstGeom prst="rect">
+            <a:avLst/>
+          </a:prstGeom>
+          <a:noFill/>
+          <a:ln w="12700">
+            <a:solidFill>
+              <a:prstClr val="black"/>
+            </a:solidFill>
+          </a:ln>
+        </p:spPr>
+        <p:txBody>
+          <a:bodyPr vert="horz" lIns="91440" tIns="45720" rIns="91440" bIns="45720" rtlCol="0" anchor="ctr"/>
+          <a:lstStyle/>
+          <a:p>
+            <a:endParaRPr lang="es-ES"/>
+          </a:p>
+        </p:txBody>
+      </p:sp>
+      <p:sp>
+        <p:nvSpPr>
+          <p:cNvPr id="5" name="Marcador de notas 4"/>
+          <p:cNvSpPr>
+            <a:spLocks noGrp="1"/>
+          </p:cNvSpPr>
+          <p:nvPr>
+            <p:ph type="body" sz="quarter" idx="3"/>
+          </p:nvPr>
+        </p:nvSpPr>
+        <p:spPr>
+          <a:xfrm>
+            <a:off x="685800" y="4400550"/>
+            <a:ext cx="5486400" cy="3600450"/>
+          </a:xfrm>
+          <a:prstGeom prst="rect">
+            <a:avLst/>
+          </a:prstGeom>
+        </p:spPr>
+        <p:txBody>
+          <a:bodyPr vert="horz" lIns="91440" tIns="45720" rIns="91440" bIns="45720" rtlCol="0"/>
+          <a:lstStyle/>
+          <a:p>
+            <a:pPr lvl="0"/>
+            <a:r>
+              <a:rPr lang="es-ES"/>
+              <a:t>Editar los estilos de texto del patrón</a:t>
+            </a:r>
+          </a:p>
+          <a:p>
+            <a:pPr lvl="1"/>
+            <a:r>
+              <a:rPr lang="es-ES"/>
+              <a:t>Segundo nivel</a:t>
+            </a:r>
+          </a:p>
+          <a:p>
+            <a:pPr lvl="2"/>
+            <a:r>
+              <a:rPr lang="es-ES"/>
+              <a:t>Tercer nivel</a:t>
+            </a:r>
+          </a:p>
+          <a:p>
+            <a:pPr lvl="3"/>
+            <a:r>
+              <a:rPr lang="es-ES"/>
+              <a:t>Cuarto nivel</a:t>
+            </a:r>
+          </a:p>
+          <a:p>
+            <a:pPr lvl="4"/>
+            <a:r>
+              <a:rPr lang="es-ES"/>
+              <a:t>Quinto nivel</a:t>
+            </a:r>
+          </a:p>
+        </p:txBody>
+      </p:sp>
+      <p:sp>
+        <p:nvSpPr>
+          <p:cNvPr id="6" name="Marcador de pie de página 5"/>
+          <p:cNvSpPr>
+            <a:spLocks noGrp="1"/>
+          </p:cNvSpPr>
+          <p:nvPr>
+            <p:ph type="ftr" sz="quarter" idx="4"/>
+          </p:nvPr>
+        </p:nvSpPr>
+        <p:spPr>
+          <a:xfrm>
+            <a:off x="0" y="8685213"/>
+            <a:ext cx="2971800" cy="458787"/>
+          </a:xfrm>
+          <a:prstGeom prst="rect">
+            <a:avLst/>
+          </a:prstGeom>
+        </p:spPr>
+        <p:txBody>
+          <a:bodyPr vert="horz" lIns="91440" tIns="45720" rIns="91440" bIns="45720" rtlCol="0" anchor="b"/>
+          <a:lstStyle>
+            <a:lvl1pPr algn="l">
+              <a:defRPr sz="1200"/>
+            </a:lvl1pPr>
+          </a:lstStyle>
+          <a:p>
+            <a:endParaRPr lang="es-ES"/>
+          </a:p>
+        </p:txBody>
+      </p:sp>
+      <p:sp>
+        <p:nvSpPr>
+          <p:cNvPr id="7" name="Marcador de número de diapositiva 6"/>
+          <p:cNvSpPr>
+            <a:spLocks noGrp="1"/>
+          </p:cNvSpPr>
+          <p:nvPr>
+            <p:ph type="sldNum" sz="quarter" idx="5"/>
+          </p:nvPr>
+        </p:nvSpPr>
+        <p:spPr>
+          <a:xfrm>
+            <a:off x="3884613" y="8685213"/>
+            <a:ext cx="2971800" cy="458787"/>
+          </a:xfrm>
+          <a:prstGeom prst="rect">
+            <a:avLst/>
+          </a:prstGeom>
+        </p:spPr>
+        <p:txBody>
+          <a:bodyPr vert="horz" lIns="91440" tIns="45720" rIns="91440" bIns="45720" rtlCol="0" anchor="b"/>
+          <a:lstStyle>
+            <a:lvl1pPr algn="r">
+              <a:defRPr sz="1200"/>
+            </a:lvl1pPr>
+          </a:lstStyle>
+          <a:p>
+            <a:fld id="{866CE464-3884-4FDE-9BD1-57C5BA5B60DD}" type="slidenum">
+              <a:rPr lang="es-ES" smtClean="0"/>
+              <a:t>‹Nº›</a:t>
+            </a:fld>
+            <a:endParaRPr lang="es-ES"/>
+          </a:p>
+        </p:txBody>
+      </p:sp>
+    </p:spTree>
+    <p:extLst>
+      <p:ext uri="{BB962C8B-B14F-4D97-AF65-F5344CB8AC3E}">
+        <p14:creationId xmlns:p14="http://schemas.microsoft.com/office/powerpoint/2010/main" val="2206953408"/>
+      </p:ext>
+    </p:extLst>
+  </p:cSld>
+  <p:clrMap bg1="lt1" tx1="dk1" bg2="lt2" tx2="dk2" accent1="accent1" accent2="accent2" accent3="accent3" accent4="accent4" accent5="accent5" accent6="accent6" hlink="hlink" folHlink="folHlink"/>
+  <p:notesStyle>
+    <a:lvl1pPr marL="0" algn="l" defTabSz="914400" rtl="0" eaLnBrk="1" latinLnBrk="0" hangingPunct="1">
+      <a:defRPr sz="1200" kern="1200">
+        <a:solidFill>
+          <a:schemeClr val="tx1"/>
+        </a:solidFill>
+        <a:latin typeface="+mn-lt"/>
+        <a:ea typeface="+mn-ea"/>
+        <a:cs typeface="+mn-cs"/>
+      </a:defRPr>
+    </a:lvl1pPr>
+    <a:lvl2pPr marL="457200" algn="l" defTabSz="914400" rtl="0" eaLnBrk="1" latinLnBrk="0" hangingPunct="1">
+      <a:defRPr sz="1200" kern="1200">
+        <a:solidFill>
+          <a:schemeClr val="tx1"/>
+        </a:solidFill>
+        <a:latin typeface="+mn-lt"/>
+        <a:ea typeface="+mn-ea"/>
+        <a:cs typeface="+mn-cs"/>
+      </a:defRPr>
+    </a:lvl2pPr>
+    <a:lvl3pPr marL="914400" algn="l" defTabSz="914400" rtl="0" eaLnBrk="1" latinLnBrk="0" hangingPunct="1">
+      <a:defRPr sz="1200" kern="1200">
+        <a:solidFill>
+          <a:schemeClr val="tx1"/>
+        </a:solidFill>
+        <a:latin typeface="+mn-lt"/>
+        <a:ea typeface="+mn-ea"/>
+        <a:cs typeface="+mn-cs"/>
+      </a:defRPr>
+    </a:lvl3pPr>
+    <a:lvl4pPr marL="1371600" algn="l" defTabSz="914400" rtl="0" eaLnBrk="1" latinLnBrk="0" hangingPunct="1">
+      <a:defRPr sz="1200" kern="1200">
+        <a:solidFill>
+          <a:schemeClr val="tx1"/>
+        </a:solidFill>
+        <a:latin typeface="+mn-lt"/>
+        <a:ea typeface="+mn-ea"/>
+        <a:cs typeface="+mn-cs"/>
+      </a:defRPr>
+    </a:lvl4pPr>
+    <a:lvl5pPr marL="1828800" algn="l" defTabSz="914400" rtl="0" eaLnBrk="1" latinLnBrk="0" hangingPunct="1">
+      <a:defRPr sz="1200" kern="1200">
+        <a:solidFill>
+          <a:schemeClr val="tx1"/>
+        </a:solidFill>
+        <a:latin typeface="+mn-lt"/>
+        <a:ea typeface="+mn-ea"/>
+        <a:cs typeface="+mn-cs"/>
+      </a:defRPr>
+    </a:lvl5pPr>
+    <a:lvl6pPr marL="2286000" algn="l" defTabSz="914400" rtl="0" eaLnBrk="1" latinLnBrk="0" hangingPunct="1">
+      <a:defRPr sz="1200" kern="1200">
+        <a:solidFill>
+          <a:schemeClr val="tx1"/>
+        </a:solidFill>
+        <a:latin typeface="+mn-lt"/>
+        <a:ea typeface="+mn-ea"/>
+        <a:cs typeface="+mn-cs"/>
+      </a:defRPr>
+    </a:lvl6pPr>
+    <a:lvl7pPr marL="2743200" algn="l" defTabSz="914400" rtl="0" eaLnBrk="1" latinLnBrk="0" hangingPunct="1">
+      <a:defRPr sz="1200" kern="1200">
+        <a:solidFill>
+          <a:schemeClr val="tx1"/>
+        </a:solidFill>
+        <a:latin typeface="+mn-lt"/>
+        <a:ea typeface="+mn-ea"/>
+        <a:cs typeface="+mn-cs"/>
+      </a:defRPr>
+    </a:lvl7pPr>
+    <a:lvl8pPr marL="3200400" algn="l" defTabSz="914400" rtl="0" eaLnBrk="1" latinLnBrk="0" hangingPunct="1">
+      <a:defRPr sz="1200" kern="1200">
+        <a:solidFill>
+          <a:schemeClr val="tx1"/>
+        </a:solidFill>
+        <a:latin typeface="+mn-lt"/>
+        <a:ea typeface="+mn-ea"/>
+        <a:cs typeface="+mn-cs"/>
+      </a:defRPr>
+    </a:lvl8pPr>
+    <a:lvl9pPr marL="3657600" algn="l" defTabSz="914400" rtl="0" eaLnBrk="1" latinLnBrk="0" hangingPunct="1">
+      <a:defRPr sz="1200" kern="1200">
+        <a:solidFill>
+          <a:schemeClr val="tx1"/>
+        </a:solidFill>
+        <a:latin typeface="+mn-lt"/>
+        <a:ea typeface="+mn-ea"/>
+        <a:cs typeface="+mn-cs"/>
+      </a:defRPr>
+    </a:lvl9pPr>
+  </p:notesStyle>
+</p:notesMaster>
+</file>
+
+<file path=ppt/notesSlides/notesSlide1.xml><?xml version="1.0" encoding="utf-8"?>
+<p:notes xmlns:a="http://schemas.openxmlformats.org/drawingml/2006/main" xmlns:r="http://schemas.openxmlformats.org/officeDocument/2006/relationships" xmlns:p="http://schemas.openxmlformats.org/presentationml/2006/main">
+  <p:cSld>
+    <p:spTree>
+      <p:nvGrpSpPr>
+        <p:cNvPr id="1" name=""/>
+        <p:cNvGrpSpPr/>
+        <p:nvPr/>
+      </p:nvGrpSpPr>
+      <p:grpSpPr>
+        <a:xfrm>
+          <a:off x="0" y="0"/>
+          <a:ext cx="0" cy="0"/>
+          <a:chOff x="0" y="0"/>
+          <a:chExt cx="0" cy="0"/>
+        </a:xfrm>
+      </p:grpSpPr>
+      <p:sp>
+        <p:nvSpPr>
+          <p:cNvPr id="2" name="Marcador de imagen de diapositiva 1"/>
+          <p:cNvSpPr>
+            <a:spLocks noGrp="1" noRot="1" noChangeAspect="1"/>
+          </p:cNvSpPr>
+          <p:nvPr>
+            <p:ph type="sldImg"/>
+          </p:nvPr>
+        </p:nvSpPr>
+        <p:spPr/>
+      </p:sp>
+      <p:sp>
+        <p:nvSpPr>
+          <p:cNvPr id="3" name="Marcador de notas 2"/>
+          <p:cNvSpPr>
+            <a:spLocks noGrp="1"/>
+          </p:cNvSpPr>
+          <p:nvPr>
+            <p:ph type="body" idx="1"/>
+          </p:nvPr>
+        </p:nvSpPr>
+        <p:spPr/>
+        <p:txBody>
+          <a:bodyPr/>
+          <a:lstStyle/>
+          <a:p>
+            <a:endParaRPr lang="es-ES" dirty="0"/>
+          </a:p>
+        </p:txBody>
+      </p:sp>
+      <p:sp>
+        <p:nvSpPr>
+          <p:cNvPr id="4" name="Marcador de número de diapositiva 3"/>
+          <p:cNvSpPr>
+            <a:spLocks noGrp="1"/>
+          </p:cNvSpPr>
+          <p:nvPr>
+            <p:ph type="sldNum" sz="quarter" idx="10"/>
+          </p:nvPr>
+        </p:nvSpPr>
+        <p:spPr/>
+        <p:txBody>
+          <a:bodyPr/>
+          <a:lstStyle/>
+          <a:p>
+            <a:fld id="{866CE464-3884-4FDE-9BD1-57C5BA5B60DD}" type="slidenum">
+              <a:rPr lang="es-ES" smtClean="0"/>
+              <a:t>1</a:t>
+            </a:fld>
+            <a:endParaRPr lang="es-ES"/>
+          </a:p>
+        </p:txBody>
+      </p:sp>
+    </p:spTree>
+    <p:extLst>
+      <p:ext uri="{BB962C8B-B14F-4D97-AF65-F5344CB8AC3E}">
+        <p14:creationId xmlns:p14="http://schemas.microsoft.com/office/powerpoint/2010/main" val="61269104"/>
+      </p:ext>
+    </p:extLst>
+  </p:cSld>
+  <p:clrMapOvr>
+    <a:masterClrMapping/>
+  </p:clrMapOvr>
+</p:notes>
 </file>
 
 <file path=ppt/slideLayouts/slideLayout1.xml><?xml version="1.0" encoding="utf-8"?>
@@ -515,7 +1066,7 @@
           <a:p>
             <a:fld id="{27FBA724-E3BE-4B45-B9E4-8921E88163E9}" type="datetimeFigureOut">
               <a:rPr lang="es-ES" smtClean="0"/>
-              <a:t>07/04/2018</a:t>
+              <a:t>09/04/2018</a:t>
             </a:fld>
             <a:endParaRPr lang="es-ES" dirty="0"/>
           </a:p>
@@ -723,7 +1274,7 @@
           <a:p>
             <a:fld id="{27FBA724-E3BE-4B45-B9E4-8921E88163E9}" type="datetimeFigureOut">
               <a:rPr lang="es-ES" smtClean="0"/>
-              <a:t>07/04/2018</a:t>
+              <a:t>09/04/2018</a:t>
             </a:fld>
             <a:endParaRPr lang="es-ES" dirty="0"/>
           </a:p>
@@ -979,7 +1530,7 @@
           <a:p>
             <a:fld id="{27FBA724-E3BE-4B45-B9E4-8921E88163E9}" type="datetimeFigureOut">
               <a:rPr lang="es-ES" smtClean="0"/>
-              <a:t>07/04/2018</a:t>
+              <a:t>09/04/2018</a:t>
             </a:fld>
             <a:endParaRPr lang="es-ES" dirty="0"/>
           </a:p>
@@ -1153,7 +1704,7 @@
           <a:p>
             <a:fld id="{27FBA724-E3BE-4B45-B9E4-8921E88163E9}" type="datetimeFigureOut">
               <a:rPr lang="es-ES" smtClean="0"/>
-              <a:t>07/04/2018</a:t>
+              <a:t>09/04/2018</a:t>
             </a:fld>
             <a:endParaRPr lang="es-ES" dirty="0"/>
           </a:p>
@@ -1496,7 +2047,7 @@
           <a:p>
             <a:fld id="{27FBA724-E3BE-4B45-B9E4-8921E88163E9}" type="datetimeFigureOut">
               <a:rPr lang="es-ES" smtClean="0"/>
-              <a:t>07/04/2018</a:t>
+              <a:t>09/04/2018</a:t>
             </a:fld>
             <a:endParaRPr lang="es-ES" dirty="0"/>
           </a:p>
@@ -1771,7 +2322,7 @@
           <a:p>
             <a:fld id="{27FBA724-E3BE-4B45-B9E4-8921E88163E9}" type="datetimeFigureOut">
               <a:rPr lang="es-ES" smtClean="0"/>
-              <a:t>07/04/2018</a:t>
+              <a:t>09/04/2018</a:t>
             </a:fld>
             <a:endParaRPr lang="es-ES" dirty="0"/>
           </a:p>
@@ -2150,7 +2701,7 @@
           <a:p>
             <a:fld id="{27FBA724-E3BE-4B45-B9E4-8921E88163E9}" type="datetimeFigureOut">
               <a:rPr lang="es-ES" smtClean="0"/>
-              <a:t>07/04/2018</a:t>
+              <a:t>09/04/2018</a:t>
             </a:fld>
             <a:endParaRPr lang="es-ES" dirty="0"/>
           </a:p>
@@ -2268,7 +2819,7 @@
           <a:p>
             <a:fld id="{27FBA724-E3BE-4B45-B9E4-8921E88163E9}" type="datetimeFigureOut">
               <a:rPr lang="es-ES" smtClean="0"/>
-              <a:t>07/04/2018</a:t>
+              <a:t>09/04/2018</a:t>
             </a:fld>
             <a:endParaRPr lang="es-ES" dirty="0"/>
           </a:p>
@@ -2439,7 +2990,7 @@
           <a:p>
             <a:fld id="{27FBA724-E3BE-4B45-B9E4-8921E88163E9}" type="datetimeFigureOut">
               <a:rPr lang="es-ES" smtClean="0"/>
-              <a:t>07/04/2018</a:t>
+              <a:t>09/04/2018</a:t>
             </a:fld>
             <a:endParaRPr lang="es-ES" dirty="0"/>
           </a:p>
@@ -2793,7 +3344,7 @@
           <a:p>
             <a:fld id="{27FBA724-E3BE-4B45-B9E4-8921E88163E9}" type="datetimeFigureOut">
               <a:rPr lang="es-ES" smtClean="0"/>
-              <a:t>07/04/2018</a:t>
+              <a:t>09/04/2018</a:t>
             </a:fld>
             <a:endParaRPr lang="es-ES" dirty="0"/>
           </a:p>
@@ -3175,7 +3726,7 @@
           <a:p>
             <a:fld id="{27FBA724-E3BE-4B45-B9E4-8921E88163E9}" type="datetimeFigureOut">
               <a:rPr lang="es-ES" smtClean="0"/>
-              <a:t>07/04/2018</a:t>
+              <a:t>09/04/2018</a:t>
             </a:fld>
             <a:endParaRPr lang="es-ES" dirty="0"/>
           </a:p>
@@ -3462,7 +4013,7 @@
           <a:p>
             <a:fld id="{27FBA724-E3BE-4B45-B9E4-8921E88163E9}" type="datetimeFigureOut">
               <a:rPr lang="es-ES" smtClean="0"/>
-              <a:t>07/04/2018</a:t>
+              <a:t>09/04/2018</a:t>
             </a:fld>
             <a:endParaRPr lang="es-ES" dirty="0"/>
           </a:p>
@@ -5356,7 +5907,7 @@
             </a:r>
             <a:r>
               <a:rPr lang="es-ES" dirty="0"/>
-              <a:t>Con conectados directamente a la máquina. </a:t>
+              <a:t>No conectados directamente a la máquina. </a:t>
             </a:r>
             <a:endParaRPr lang="es-ES" b="1" dirty="0"/>
           </a:p>
@@ -5484,7 +6035,7 @@
             </a:r>
             <a:r>
               <a:rPr lang="es-ES" dirty="0"/>
-              <a:t> Se realiza la comunicación bit a bit (USB, COM1, PS/2)</a:t>
+              <a:t> Se realiza la comunicación bit a bit (USB, COM1, PS/2, SATA)</a:t>
             </a:r>
           </a:p>
           <a:p>
@@ -5498,7 +6049,7 @@
             </a:r>
             <a:r>
               <a:rPr lang="es-ES" dirty="0"/>
-              <a:t> Se realiza la comunicación en paquetes de 1 o más bytes (LPT, SATA, IDE)</a:t>
+              <a:t> Se realiza la comunicación en paquetes de 1 o más bytes (LPT, IDE)</a:t>
             </a:r>
           </a:p>
         </p:txBody>
@@ -5611,13 +6162,21 @@
           <a:p>
             <a:r>
               <a:rPr lang="es-ES" dirty="0"/>
-              <a:t>- Trackabll</a:t>
-            </a:r>
-          </a:p>
-          <a:p>
-            <a:r>
-              <a:rPr lang="es-ES" dirty="0"/>
-              <a:t>- Touchpad</a:t>
+              <a:t>- </a:t>
+            </a:r>
+            <a:r>
+              <a:rPr lang="es-ES" dirty="0" err="1"/>
+              <a:t>Trackaball</a:t>
+            </a:r>
+            <a:r>
+              <a:rPr lang="es-ES" dirty="0"/>
+              <a:t>: Especie de ratón con una bola enorme</a:t>
+            </a:r>
+          </a:p>
+          <a:p>
+            <a:r>
+              <a:rPr lang="es-ES" dirty="0"/>
+              <a:t>- Touchpad: Mouse de los portátiles</a:t>
             </a:r>
           </a:p>
           <a:p>
@@ -5746,7 +6305,10 @@
               <a:rPr lang="es-ES" dirty="0" err="1"/>
               <a:t>Ploter</a:t>
             </a:r>
-            <a:endParaRPr lang="es-ES" dirty="0"/>
+            <a:r>
+              <a:rPr lang="es-ES" dirty="0"/>
+              <a:t>: Impresora grande que permite imprimir planos o elementos muy grandes.</a:t>
+            </a:r>
           </a:p>
           <a:p>
             <a:r>
@@ -6194,6 +6756,14 @@
 <file path=ppt/slides/slide21.xml><?xml version="1.0" encoding="utf-8"?>
 <p:sld xmlns:a="http://schemas.openxmlformats.org/drawingml/2006/main" xmlns:r="http://schemas.openxmlformats.org/officeDocument/2006/relationships" xmlns:p="http://schemas.openxmlformats.org/presentationml/2006/main">
   <p:cSld>
+    <p:bg>
+      <p:bgPr>
+        <a:solidFill>
+          <a:schemeClr val="bg1"/>
+        </a:solidFill>
+        <a:effectLst/>
+      </p:bgPr>
+    </p:bg>
     <p:spTree>
       <p:nvGrpSpPr>
         <p:cNvPr id="1" name=""/>
@@ -6208,6 +6778,36 @@
           <a:chExt cx="0" cy="0"/>
         </a:xfrm>
       </p:grpSpPr>
+      <p:pic>
+        <p:nvPicPr>
+          <p:cNvPr id="4" name="Imagen 4" descr="Imagen que contiene texto&#10;&#10;Descripción generada con confianza muy alta">
+            <a:extLst>
+              <a:ext uri="{FF2B5EF4-FFF2-40B4-BE49-F238E27FC236}">
+                <a16:creationId xmlns:a16="http://schemas.microsoft.com/office/drawing/2014/main" id="{F6DDC8EE-65C2-4553-9389-61E3DE021C2C}"/>
+              </a:ext>
+            </a:extLst>
+          </p:cNvPr>
+          <p:cNvPicPr>
+            <a:picLocks noChangeAspect="1"/>
+          </p:cNvPicPr>
+          <p:nvPr/>
+        </p:nvPicPr>
+        <p:blipFill>
+          <a:blip r:embed="rId2"/>
+          <a:stretch>
+            <a:fillRect/>
+          </a:stretch>
+        </p:blipFill>
+        <p:spPr>
+          <a:xfrm>
+            <a:off x="8415485" y="1916318"/>
+            <a:ext cx="2345278" cy="3471012"/>
+          </a:xfrm>
+          <a:prstGeom prst="rect">
+            <a:avLst/>
+          </a:prstGeom>
+        </p:spPr>
+      </p:pic>
       <p:sp>
         <p:nvSpPr>
           <p:cNvPr id="2" name="Título 1">
@@ -6224,12 +6824,18 @@
             <p:ph type="title"/>
           </p:nvPr>
         </p:nvSpPr>
-        <p:spPr/>
-        <p:txBody>
-          <a:bodyPr/>
-          <a:lstStyle/>
-          <a:p>
-            <a:pPr algn="ctr"/>
+        <p:spPr>
+          <a:xfrm>
+            <a:off x="1097280" y="286603"/>
+            <a:ext cx="10058400" cy="1450757"/>
+          </a:xfrm>
+        </p:spPr>
+        <p:txBody>
+          <a:bodyPr>
+            <a:normAutofit/>
+          </a:bodyPr>
+          <a:lstStyle/>
+          <a:p>
             <a:r>
               <a:rPr lang="es-ES" dirty="0"/>
               <a:t>Software o elemento lógico</a:t>
@@ -6241,6 +6847,7 @@
               <a:rPr lang="es-ES" dirty="0"/>
               <a:t>Clasificación según funcionalidad</a:t>
             </a:r>
+            <a:endParaRPr lang="es-ES"/>
           </a:p>
         </p:txBody>
       </p:sp>
@@ -6260,9 +6867,16 @@
             <p:ph idx="1"/>
           </p:nvPr>
         </p:nvSpPr>
-        <p:spPr/>
-        <p:txBody>
-          <a:bodyPr/>
+        <p:spPr>
+          <a:xfrm>
+            <a:off x="1097279" y="1845734"/>
+            <a:ext cx="6454987" cy="4023360"/>
+          </a:xfrm>
+        </p:spPr>
+        <p:txBody>
+          <a:bodyPr>
+            <a:normAutofit/>
+          </a:bodyPr>
           <a:lstStyle/>
           <a:p>
             <a:r>
@@ -6570,7 +7184,31 @@
           <a:p>
             <a:r>
               <a:rPr lang="es-ES" dirty="0"/>
-              <a:t>Bloque de caracteres que acompaña a un documento acreditando quien es su autor (autenticación), que no ha existido ninguna manipulación posterior de los datos (integridad) y que impide que pueda negar su autoría (no revocación).</a:t>
+              <a:t>Bloque de caracteres que acompaña a un documento acreditando quien es su autor (</a:t>
+            </a:r>
+            <a:r>
+              <a:rPr lang="es-ES" b="1" dirty="0"/>
+              <a:t>autenticación</a:t>
+            </a:r>
+            <a:r>
+              <a:rPr lang="es-ES" dirty="0"/>
+              <a:t>), que no ha existido ninguna manipulación posterior de los datos (</a:t>
+            </a:r>
+            <a:r>
+              <a:rPr lang="es-ES" b="1" dirty="0"/>
+              <a:t>integridad</a:t>
+            </a:r>
+            <a:r>
+              <a:rPr lang="es-ES" dirty="0"/>
+              <a:t>) y que impide que pueda negar su autoría (</a:t>
+            </a:r>
+            <a:r>
+              <a:rPr lang="es-ES" b="1" dirty="0"/>
+              <a:t>no revocación</a:t>
+            </a:r>
+            <a:r>
+              <a:rPr lang="es-ES" dirty="0"/>
+              <a:t>).</a:t>
             </a:r>
           </a:p>
         </p:txBody>
@@ -8739,4 +9377,299 @@
     </a:ext>
   </a:extLst>
 </a:theme>
+</file>
+
+<file path=ppt/theme/theme2.xml><?xml version="1.0" encoding="utf-8"?>
+<a:theme xmlns:a="http://schemas.openxmlformats.org/drawingml/2006/main" name="Tema de Office">
+  <a:themeElements>
+    <a:clrScheme name="Office">
+      <a:dk1>
+        <a:sysClr val="windowText" lastClr="000000"/>
+      </a:dk1>
+      <a:lt1>
+        <a:sysClr val="window" lastClr="FFFFFF"/>
+      </a:lt1>
+      <a:dk2>
+        <a:srgbClr val="44546A"/>
+      </a:dk2>
+      <a:lt2>
+        <a:srgbClr val="E7E6E6"/>
+      </a:lt2>
+      <a:accent1>
+        <a:srgbClr val="4472C4"/>
+      </a:accent1>
+      <a:accent2>
+        <a:srgbClr val="ED7D31"/>
+      </a:accent2>
+      <a:accent3>
+        <a:srgbClr val="A5A5A5"/>
+      </a:accent3>
+      <a:accent4>
+        <a:srgbClr val="FFC000"/>
+      </a:accent4>
+      <a:accent5>
+        <a:srgbClr val="5B9BD5"/>
+      </a:accent5>
+      <a:accent6>
+        <a:srgbClr val="70AD47"/>
+      </a:accent6>
+      <a:hlink>
+        <a:srgbClr val="0563C1"/>
+      </a:hlink>
+      <a:folHlink>
+        <a:srgbClr val="954F72"/>
+      </a:folHlink>
+    </a:clrScheme>
+    <a:fontScheme name="Office">
+      <a:majorFont>
+        <a:latin typeface="Calibri Light" panose="020F0302020204030204"/>
+        <a:ea typeface=""/>
+        <a:cs typeface=""/>
+        <a:font script="Jpan" typeface="游ゴシック Light"/>
+        <a:font script="Hang" typeface="맑은 고딕"/>
+        <a:font script="Hans" typeface="等线 Light"/>
+        <a:font script="Hant" typeface="新細明體"/>
+        <a:font script="Arab" typeface="Times New Roman"/>
+        <a:font script="Hebr" typeface="Times New Roman"/>
+        <a:font script="Thai" typeface="Angsana New"/>
+        <a:font script="Ethi" typeface="Nyala"/>
+        <a:font script="Beng" typeface="Vrinda"/>
+        <a:font script="Gujr" typeface="Shruti"/>
+        <a:font script="Khmr" typeface="MoolBoran"/>
+        <a:font script="Knda" typeface="Tunga"/>
+        <a:font script="Guru" typeface="Raavi"/>
+        <a:font script="Cans" typeface="Euphemia"/>
+        <a:font script="Cher" typeface="Plantagenet Cherokee"/>
+        <a:font script="Yiii" typeface="Microsoft Yi Baiti"/>
+        <a:font script="Tibt" typeface="Microsoft Himalaya"/>
+        <a:font script="Thaa" typeface="MV Boli"/>
+        <a:font script="Deva" typeface="Mangal"/>
+        <a:font script="Telu" typeface="Gautami"/>
+        <a:font script="Taml" typeface="Latha"/>
+        <a:font script="Syrc" typeface="Estrangelo Edessa"/>
+        <a:font script="Orya" typeface="Kalinga"/>
+        <a:font script="Mlym" typeface="Kartika"/>
+        <a:font script="Laoo" typeface="DokChampa"/>
+        <a:font script="Sinh" typeface="Iskoola Pota"/>
+        <a:font script="Mong" typeface="Mongolian Baiti"/>
+        <a:font script="Viet" typeface="Times New Roman"/>
+        <a:font script="Uigh" typeface="Microsoft Uighur"/>
+        <a:font script="Geor" typeface="Sylfaen"/>
+        <a:font script="Armn" typeface="Arial"/>
+        <a:font script="Bugi" typeface="Leelawadee UI"/>
+        <a:font script="Bopo" typeface="Microsoft JhengHei"/>
+        <a:font script="Java" typeface="Javanese Text"/>
+        <a:font script="Lisu" typeface="Segoe UI"/>
+        <a:font script="Mymr" typeface="Myanmar Text"/>
+        <a:font script="Nkoo" typeface="Ebrima"/>
+        <a:font script="Olck" typeface="Nirmala UI"/>
+        <a:font script="Osma" typeface="Ebrima"/>
+        <a:font script="Phag" typeface="Phagspa"/>
+        <a:font script="Syrn" typeface="Estrangelo Edessa"/>
+        <a:font script="Syrj" typeface="Estrangelo Edessa"/>
+        <a:font script="Syre" typeface="Estrangelo Edessa"/>
+        <a:font script="Sora" typeface="Nirmala UI"/>
+        <a:font script="Tale" typeface="Microsoft Tai Le"/>
+        <a:font script="Talu" typeface="Microsoft New Tai Lue"/>
+        <a:font script="Tfng" typeface="Ebrima"/>
+      </a:majorFont>
+      <a:minorFont>
+        <a:latin typeface="Calibri" panose="020F0502020204030204"/>
+        <a:ea typeface=""/>
+        <a:cs typeface=""/>
+        <a:font script="Jpan" typeface="游ゴシック"/>
+        <a:font script="Hang" typeface="맑은 고딕"/>
+        <a:font script="Hans" typeface="等线"/>
+        <a:font script="Hant" typeface="新細明體"/>
+        <a:font script="Arab" typeface="Arial"/>
+        <a:font script="Hebr" typeface="Arial"/>
+        <a:font script="Thai" typeface="Cordia New"/>
+        <a:font script="Ethi" typeface="Nyala"/>
+        <a:font script="Beng" typeface="Vrinda"/>
+        <a:font script="Gujr" typeface="Shruti"/>
+        <a:font script="Khmr" typeface="DaunPenh"/>
+        <a:font script="Knda" typeface="Tunga"/>
+        <a:font script="Guru" typeface="Raavi"/>
+        <a:font script="Cans" typeface="Euphemia"/>
+        <a:font script="Cher" typeface="Plantagenet Cherokee"/>
+        <a:font script="Yiii" typeface="Microsoft Yi Baiti"/>
+        <a:font script="Tibt" typeface="Microsoft Himalaya"/>
+        <a:font script="Thaa" typeface="MV Boli"/>
+        <a:font script="Deva" typeface="Mangal"/>
+        <a:font script="Telu" typeface="Gautami"/>
+        <a:font script="Taml" typeface="Latha"/>
+        <a:font script="Syrc" typeface="Estrangelo Edessa"/>
+        <a:font script="Orya" typeface="Kalinga"/>
+        <a:font script="Mlym" typeface="Kartika"/>
+        <a:font script="Laoo" typeface="DokChampa"/>
+        <a:font script="Sinh" typeface="Iskoola Pota"/>
+        <a:font script="Mong" typeface="Mongolian Baiti"/>
+        <a:font script="Viet" typeface="Arial"/>
+        <a:font script="Uigh" typeface="Microsoft Uighur"/>
+        <a:font script="Geor" typeface="Sylfaen"/>
+        <a:font script="Armn" typeface="Arial"/>
+        <a:font script="Bugi" typeface="Leelawadee UI"/>
+        <a:font script="Bopo" typeface="Microsoft JhengHei"/>
+        <a:font script="Java" typeface="Javanese Text"/>
+        <a:font script="Lisu" typeface="Segoe UI"/>
+        <a:font script="Mymr" typeface="Myanmar Text"/>
+        <a:font script="Nkoo" typeface="Ebrima"/>
+        <a:font script="Olck" typeface="Nirmala UI"/>
+        <a:font script="Osma" typeface="Ebrima"/>
+        <a:font script="Phag" typeface="Phagspa"/>
+        <a:font script="Syrn" typeface="Estrangelo Edessa"/>
+        <a:font script="Syrj" typeface="Estrangelo Edessa"/>
+        <a:font script="Syre" typeface="Estrangelo Edessa"/>
+        <a:font script="Sora" typeface="Nirmala UI"/>
+        <a:font script="Tale" typeface="Microsoft Tai Le"/>
+        <a:font script="Talu" typeface="Microsoft New Tai Lue"/>
+        <a:font script="Tfng" typeface="Ebrima"/>
+      </a:minorFont>
+    </a:fontScheme>
+    <a:fmtScheme name="Office">
+      <a:fillStyleLst>
+        <a:solidFill>
+          <a:schemeClr val="phClr"/>
+        </a:solidFill>
+        <a:gradFill rotWithShape="1">
+          <a:gsLst>
+            <a:gs pos="0">
+              <a:schemeClr val="phClr">
+                <a:lumMod val="110000"/>
+                <a:satMod val="105000"/>
+                <a:tint val="67000"/>
+              </a:schemeClr>
+            </a:gs>
+            <a:gs pos="50000">
+              <a:schemeClr val="phClr">
+                <a:lumMod val="105000"/>
+                <a:satMod val="103000"/>
+                <a:tint val="73000"/>
+              </a:schemeClr>
+            </a:gs>
+            <a:gs pos="100000">
+              <a:schemeClr val="phClr">
+                <a:lumMod val="105000"/>
+                <a:satMod val="109000"/>
+                <a:tint val="81000"/>
+              </a:schemeClr>
+            </a:gs>
+          </a:gsLst>
+          <a:lin ang="5400000" scaled="0"/>
+        </a:gradFill>
+        <a:gradFill rotWithShape="1">
+          <a:gsLst>
+            <a:gs pos="0">
+              <a:schemeClr val="phClr">
+                <a:satMod val="103000"/>
+                <a:lumMod val="102000"/>
+                <a:tint val="94000"/>
+              </a:schemeClr>
+            </a:gs>
+            <a:gs pos="50000">
+              <a:schemeClr val="phClr">
+                <a:satMod val="110000"/>
+                <a:lumMod val="100000"/>
+                <a:shade val="100000"/>
+              </a:schemeClr>
+            </a:gs>
+            <a:gs pos="100000">
+              <a:schemeClr val="phClr">
+                <a:lumMod val="99000"/>
+                <a:satMod val="120000"/>
+                <a:shade val="78000"/>
+              </a:schemeClr>
+            </a:gs>
+          </a:gsLst>
+          <a:lin ang="5400000" scaled="0"/>
+        </a:gradFill>
+      </a:fillStyleLst>
+      <a:lnStyleLst>
+        <a:ln w="6350" cap="flat" cmpd="sng" algn="ctr">
+          <a:solidFill>
+            <a:schemeClr val="phClr"/>
+          </a:solidFill>
+          <a:prstDash val="solid"/>
+          <a:miter lim="800000"/>
+        </a:ln>
+        <a:ln w="12700" cap="flat" cmpd="sng" algn="ctr">
+          <a:solidFill>
+            <a:schemeClr val="phClr"/>
+          </a:solidFill>
+          <a:prstDash val="solid"/>
+          <a:miter lim="800000"/>
+        </a:ln>
+        <a:ln w="19050" cap="flat" cmpd="sng" algn="ctr">
+          <a:solidFill>
+            <a:schemeClr val="phClr"/>
+          </a:solidFill>
+          <a:prstDash val="solid"/>
+          <a:miter lim="800000"/>
+        </a:ln>
+      </a:lnStyleLst>
+      <a:effectStyleLst>
+        <a:effectStyle>
+          <a:effectLst/>
+        </a:effectStyle>
+        <a:effectStyle>
+          <a:effectLst/>
+        </a:effectStyle>
+        <a:effectStyle>
+          <a:effectLst>
+            <a:outerShdw blurRad="57150" dist="19050" dir="5400000" algn="ctr" rotWithShape="0">
+              <a:srgbClr val="000000">
+                <a:alpha val="63000"/>
+              </a:srgbClr>
+            </a:outerShdw>
+          </a:effectLst>
+        </a:effectStyle>
+      </a:effectStyleLst>
+      <a:bgFillStyleLst>
+        <a:solidFill>
+          <a:schemeClr val="phClr"/>
+        </a:solidFill>
+        <a:solidFill>
+          <a:schemeClr val="phClr">
+            <a:tint val="95000"/>
+            <a:satMod val="170000"/>
+          </a:schemeClr>
+        </a:solidFill>
+        <a:gradFill rotWithShape="1">
+          <a:gsLst>
+            <a:gs pos="0">
+              <a:schemeClr val="phClr">
+                <a:tint val="93000"/>
+                <a:satMod val="150000"/>
+                <a:shade val="98000"/>
+                <a:lumMod val="102000"/>
+              </a:schemeClr>
+            </a:gs>
+            <a:gs pos="50000">
+              <a:schemeClr val="phClr">
+                <a:tint val="98000"/>
+                <a:satMod val="130000"/>
+                <a:shade val="90000"/>
+                <a:lumMod val="103000"/>
+              </a:schemeClr>
+            </a:gs>
+            <a:gs pos="100000">
+              <a:schemeClr val="phClr">
+                <a:shade val="63000"/>
+                <a:satMod val="120000"/>
+              </a:schemeClr>
+            </a:gs>
+          </a:gsLst>
+          <a:lin ang="5400000" scaled="0"/>
+        </a:gradFill>
+      </a:bgFillStyleLst>
+    </a:fmtScheme>
+  </a:themeElements>
+  <a:objectDefaults/>
+  <a:extraClrSchemeLst/>
+  <a:extLst>
+    <a:ext uri="{05A4C25C-085E-4340-85A3-A5531E510DB2}">
+      <thm15:themeFamily xmlns:thm15="http://schemas.microsoft.com/office/thememl/2012/main" name="Office Theme" id="{62F939B6-93AF-4DB8-9C6B-D6C7DFDC589F}" vid="{4A3C46E8-61CC-4603-A589-7422A47A8E4A}"/>
+    </a:ext>
+  </a:extLst>
+</a:theme>
 </file>
</xml_diff>